<commit_message>
add interpage to show response
</commit_message>
<xml_diff>
--- a/doc/diagrammeClasse.pptx
+++ b/doc/diagrammeClasse.pptx
@@ -288,7 +288,7 @@
           <a:p>
             <a:fld id="{98E946B3-054E-4BA7-AFE1-09C9F87E35AE}" type="datetimeFigureOut">
               <a:rPr lang="fr-FR" smtClean="0"/>
-              <a:t>23/03/2023</a:t>
+              <a:t>24/03/2023</a:t>
             </a:fld>
             <a:endParaRPr lang="fr-FR"/>
           </a:p>
@@ -458,7 +458,7 @@
           <a:p>
             <a:fld id="{98E946B3-054E-4BA7-AFE1-09C9F87E35AE}" type="datetimeFigureOut">
               <a:rPr lang="fr-FR" smtClean="0"/>
-              <a:t>23/03/2023</a:t>
+              <a:t>24/03/2023</a:t>
             </a:fld>
             <a:endParaRPr lang="fr-FR"/>
           </a:p>
@@ -638,7 +638,7 @@
           <a:p>
             <a:fld id="{98E946B3-054E-4BA7-AFE1-09C9F87E35AE}" type="datetimeFigureOut">
               <a:rPr lang="fr-FR" smtClean="0"/>
-              <a:t>23/03/2023</a:t>
+              <a:t>24/03/2023</a:t>
             </a:fld>
             <a:endParaRPr lang="fr-FR"/>
           </a:p>
@@ -808,7 +808,7 @@
           <a:p>
             <a:fld id="{98E946B3-054E-4BA7-AFE1-09C9F87E35AE}" type="datetimeFigureOut">
               <a:rPr lang="fr-FR" smtClean="0"/>
-              <a:t>23/03/2023</a:t>
+              <a:t>24/03/2023</a:t>
             </a:fld>
             <a:endParaRPr lang="fr-FR"/>
           </a:p>
@@ -1054,7 +1054,7 @@
           <a:p>
             <a:fld id="{98E946B3-054E-4BA7-AFE1-09C9F87E35AE}" type="datetimeFigureOut">
               <a:rPr lang="fr-FR" smtClean="0"/>
-              <a:t>23/03/2023</a:t>
+              <a:t>24/03/2023</a:t>
             </a:fld>
             <a:endParaRPr lang="fr-FR"/>
           </a:p>
@@ -1342,7 +1342,7 @@
           <a:p>
             <a:fld id="{98E946B3-054E-4BA7-AFE1-09C9F87E35AE}" type="datetimeFigureOut">
               <a:rPr lang="fr-FR" smtClean="0"/>
-              <a:t>23/03/2023</a:t>
+              <a:t>24/03/2023</a:t>
             </a:fld>
             <a:endParaRPr lang="fr-FR"/>
           </a:p>
@@ -1764,7 +1764,7 @@
           <a:p>
             <a:fld id="{98E946B3-054E-4BA7-AFE1-09C9F87E35AE}" type="datetimeFigureOut">
               <a:rPr lang="fr-FR" smtClean="0"/>
-              <a:t>23/03/2023</a:t>
+              <a:t>24/03/2023</a:t>
             </a:fld>
             <a:endParaRPr lang="fr-FR"/>
           </a:p>
@@ -1882,7 +1882,7 @@
           <a:p>
             <a:fld id="{98E946B3-054E-4BA7-AFE1-09C9F87E35AE}" type="datetimeFigureOut">
               <a:rPr lang="fr-FR" smtClean="0"/>
-              <a:t>23/03/2023</a:t>
+              <a:t>24/03/2023</a:t>
             </a:fld>
             <a:endParaRPr lang="fr-FR"/>
           </a:p>
@@ -1977,7 +1977,7 @@
           <a:p>
             <a:fld id="{98E946B3-054E-4BA7-AFE1-09C9F87E35AE}" type="datetimeFigureOut">
               <a:rPr lang="fr-FR" smtClean="0"/>
-              <a:t>23/03/2023</a:t>
+              <a:t>24/03/2023</a:t>
             </a:fld>
             <a:endParaRPr lang="fr-FR"/>
           </a:p>
@@ -2254,7 +2254,7 @@
           <a:p>
             <a:fld id="{98E946B3-054E-4BA7-AFE1-09C9F87E35AE}" type="datetimeFigureOut">
               <a:rPr lang="fr-FR" smtClean="0"/>
-              <a:t>23/03/2023</a:t>
+              <a:t>24/03/2023</a:t>
             </a:fld>
             <a:endParaRPr lang="fr-FR"/>
           </a:p>
@@ -2507,7 +2507,7 @@
           <a:p>
             <a:fld id="{98E946B3-054E-4BA7-AFE1-09C9F87E35AE}" type="datetimeFigureOut">
               <a:rPr lang="fr-FR" smtClean="0"/>
-              <a:t>23/03/2023</a:t>
+              <a:t>24/03/2023</a:t>
             </a:fld>
             <a:endParaRPr lang="fr-FR"/>
           </a:p>
@@ -2720,7 +2720,7 @@
           <a:p>
             <a:fld id="{98E946B3-054E-4BA7-AFE1-09C9F87E35AE}" type="datetimeFigureOut">
               <a:rPr lang="fr-FR" smtClean="0"/>
-              <a:t>23/03/2023</a:t>
+              <a:t>24/03/2023</a:t>
             </a:fld>
             <a:endParaRPr lang="fr-FR"/>
           </a:p>
@@ -3107,7 +3107,7 @@
         </p:nvSpPr>
         <p:spPr>
           <a:xfrm>
-            <a:off x="3347864" y="1988840"/>
+            <a:off x="3707904" y="1988840"/>
             <a:ext cx="1512168" cy="1224136"/>
           </a:xfrm>
           <a:solidFill>
@@ -3179,7 +3179,7 @@
         </p:nvSpPr>
         <p:spPr>
           <a:xfrm>
-            <a:off x="179512" y="3745220"/>
+            <a:off x="539552" y="3745220"/>
             <a:ext cx="1872208" cy="936104"/>
           </a:xfrm>
           <a:prstGeom prst="rect">
@@ -3251,7 +3251,7 @@
         </p:nvSpPr>
         <p:spPr>
           <a:xfrm>
-            <a:off x="2195736" y="3745220"/>
+            <a:off x="2555776" y="3745220"/>
             <a:ext cx="1728192" cy="936104"/>
           </a:xfrm>
           <a:prstGeom prst="rect">
@@ -3323,7 +3323,7 @@
         </p:nvSpPr>
         <p:spPr>
           <a:xfrm>
-            <a:off x="4427984" y="3745220"/>
+            <a:off x="4788024" y="3745220"/>
             <a:ext cx="1728192" cy="936104"/>
           </a:xfrm>
           <a:prstGeom prst="rect">
@@ -3395,7 +3395,7 @@
         </p:nvSpPr>
         <p:spPr>
           <a:xfrm>
-            <a:off x="3275856" y="476672"/>
+            <a:off x="3635896" y="476672"/>
             <a:ext cx="1512168" cy="1224136"/>
           </a:xfrm>
           <a:prstGeom prst="rect">
@@ -3465,13 +3465,12 @@
           <p:cNvPr id="11" name="Connecteur en angle 10"/>
           <p:cNvCxnSpPr>
             <a:stCxn id="4" idx="0"/>
-            <a:endCxn id="2" idx="1"/>
           </p:cNvCxnSpPr>
           <p:nvPr/>
         </p:nvCxnSpPr>
         <p:spPr>
           <a:xfrm rot="5400000" flipH="1" flipV="1">
-            <a:off x="1659584" y="2056940"/>
+            <a:off x="2019624" y="2056940"/>
             <a:ext cx="1144312" cy="2232248"/>
           </a:xfrm>
           <a:prstGeom prst="bentConnector2">
@@ -3501,13 +3500,12 @@
           <p:cNvPr id="13" name="Connecteur en angle 12"/>
           <p:cNvCxnSpPr>
             <a:stCxn id="5" idx="0"/>
-            <a:endCxn id="2" idx="1"/>
           </p:cNvCxnSpPr>
           <p:nvPr/>
         </p:nvCxnSpPr>
         <p:spPr>
           <a:xfrm rot="5400000" flipH="1" flipV="1">
-            <a:off x="2631692" y="3029048"/>
+            <a:off x="2991732" y="3029048"/>
             <a:ext cx="1144312" cy="288032"/>
           </a:xfrm>
           <a:prstGeom prst="bentConnector2">
@@ -3537,13 +3535,12 @@
           <p:cNvPr id="15" name="Connecteur en angle 14"/>
           <p:cNvCxnSpPr>
             <a:stCxn id="6" idx="0"/>
-            <a:endCxn id="2" idx="3"/>
           </p:cNvCxnSpPr>
           <p:nvPr/>
         </p:nvCxnSpPr>
         <p:spPr>
           <a:xfrm rot="16200000" flipV="1">
-            <a:off x="4503900" y="2957040"/>
+            <a:off x="4863940" y="2957040"/>
             <a:ext cx="1144312" cy="432048"/>
           </a:xfrm>
           <a:prstGeom prst="bentConnector2">
@@ -3579,7 +3576,7 @@
         </p:nvCxnSpPr>
         <p:spPr>
           <a:xfrm rot="16200000" flipV="1">
-            <a:off x="3923928" y="1808820"/>
+            <a:off x="4283968" y="1808820"/>
             <a:ext cx="288032" cy="72008"/>
           </a:xfrm>
           <a:prstGeom prst="bentConnector3">
@@ -3618,7 +3615,7 @@
         </p:nvSpPr>
         <p:spPr>
           <a:xfrm>
-            <a:off x="6516216" y="3740149"/>
+            <a:off x="6876256" y="3740149"/>
             <a:ext cx="2160240" cy="936104"/>
           </a:xfrm>
           <a:prstGeom prst="rect">
@@ -3681,13 +3678,12 @@
           <p:cNvPr id="25" name="Connecteur en angle 24"/>
           <p:cNvCxnSpPr>
             <a:stCxn id="23" idx="0"/>
-            <a:endCxn id="2" idx="3"/>
           </p:cNvCxnSpPr>
           <p:nvPr/>
         </p:nvCxnSpPr>
         <p:spPr>
           <a:xfrm rot="16200000" flipV="1">
-            <a:off x="5658564" y="1802377"/>
+            <a:off x="6018604" y="1802377"/>
             <a:ext cx="1139241" cy="2736304"/>
           </a:xfrm>
           <a:prstGeom prst="bentConnector2">
@@ -3722,7 +3718,7 @@
         </p:nvSpPr>
         <p:spPr>
           <a:xfrm>
-            <a:off x="3275856" y="5013176"/>
+            <a:off x="3635896" y="5013176"/>
             <a:ext cx="1656184" cy="1224136"/>
           </a:xfrm>
           <a:prstGeom prst="rect">
@@ -3776,6 +3772,16 @@
               <a:rPr lang="fr-FR" sz="1200" dirty="0" smtClean="0"/>
               <a:t>score</a:t>
             </a:r>
+          </a:p>
+          <a:p>
+            <a:r>
+              <a:rPr lang="fr-FR" sz="1200" dirty="0" err="1" smtClean="0"/>
+              <a:t>numQuestion</a:t>
+            </a:r>
+            <a:r>
+              <a:rPr lang="fr-FR" sz="1200" dirty="0" smtClean="0"/>
+              <a:t/>
+            </a:r>
             <a:br>
               <a:rPr lang="fr-FR" sz="1200" dirty="0" smtClean="0"/>
             </a:br>
@@ -3802,10 +3808,206 @@
         </p:nvCxnSpPr>
         <p:spPr>
           <a:xfrm flipV="1">
-            <a:off x="4103948" y="3212976"/>
+            <a:off x="4463988" y="3212976"/>
             <a:ext cx="0" cy="1800200"/>
           </a:xfrm>
           <a:prstGeom prst="line">
+            <a:avLst/>
+          </a:prstGeom>
+          <a:ln>
+            <a:solidFill>
+              <a:schemeClr val="accent2">
+                <a:lumMod val="75000"/>
+              </a:schemeClr>
+            </a:solidFill>
+          </a:ln>
+        </p:spPr>
+        <p:style>
+          <a:lnRef idx="1">
+            <a:schemeClr val="accent1"/>
+          </a:lnRef>
+          <a:fillRef idx="0">
+            <a:schemeClr val="accent1"/>
+          </a:fillRef>
+          <a:effectRef idx="0">
+            <a:schemeClr val="accent1"/>
+          </a:effectRef>
+          <a:fontRef idx="minor">
+            <a:schemeClr val="tx1"/>
+          </a:fontRef>
+        </p:style>
+      </p:cxnSp>
+      <p:sp>
+        <p:nvSpPr>
+          <p:cNvPr id="16" name="Titre 1"/>
+          <p:cNvSpPr txBox="1">
+            <a:spLocks/>
+          </p:cNvSpPr>
+          <p:nvPr/>
+        </p:nvSpPr>
+        <p:spPr>
+          <a:xfrm>
+            <a:off x="179512" y="476672"/>
+            <a:ext cx="2304256" cy="1224136"/>
+          </a:xfrm>
+          <a:prstGeom prst="rect">
+            <a:avLst/>
+          </a:prstGeom>
+          <a:solidFill>
+            <a:schemeClr val="accent1">
+              <a:lumMod val="60000"/>
+              <a:lumOff val="40000"/>
+            </a:schemeClr>
+          </a:solidFill>
+          <a:ln>
+            <a:solidFill>
+              <a:schemeClr val="accent1"/>
+            </a:solidFill>
+          </a:ln>
+        </p:spPr>
+        <p:txBody>
+          <a:bodyPr vert="horz" lIns="91440" tIns="45720" rIns="91440" bIns="45720" rtlCol="0" anchor="ctr">
+            <a:normAutofit/>
+          </a:bodyPr>
+          <a:lstStyle>
+            <a:lvl1pPr algn="ctr" defTabSz="914400" rtl="0" eaLnBrk="1" latinLnBrk="0" hangingPunct="1">
+              <a:spcBef>
+                <a:spcPct val="0"/>
+              </a:spcBef>
+              <a:buNone/>
+              <a:defRPr sz="4400" kern="1200">
+                <a:solidFill>
+                  <a:schemeClr val="tx1"/>
+                </a:solidFill>
+                <a:latin typeface="+mj-lt"/>
+                <a:ea typeface="+mj-ea"/>
+                <a:cs typeface="+mj-cs"/>
+              </a:defRPr>
+            </a:lvl1pPr>
+          </a:lstStyle>
+          <a:p>
+            <a:r>
+              <a:rPr lang="fr-FR" sz="2000" dirty="0" err="1" smtClean="0"/>
+              <a:t>Saisie</a:t>
+            </a:r>
+            <a:r>
+              <a:rPr lang="fr-FR" sz="2000" dirty="0" err="1" smtClean="0"/>
+              <a:t>Utilisateur</a:t>
+            </a:r>
+            <a:endParaRPr lang="fr-FR" dirty="0"/>
+          </a:p>
+          <a:p>
+            <a:r>
+              <a:rPr lang="fr-FR" sz="1200" dirty="0" smtClean="0"/>
+              <a:t>Question</a:t>
+            </a:r>
+          </a:p>
+          <a:p>
+            <a:r>
+              <a:rPr lang="fr-FR" sz="1200" dirty="0" err="1" smtClean="0"/>
+              <a:t>reponseChoisie</a:t>
+            </a:r>
+            <a:endParaRPr lang="fr-FR" sz="1200" dirty="0"/>
+          </a:p>
+        </p:txBody>
+      </p:sp>
+      <p:cxnSp>
+        <p:nvCxnSpPr>
+          <p:cNvPr id="9" name="Connecteur droit 8"/>
+          <p:cNvCxnSpPr>
+            <a:stCxn id="16" idx="3"/>
+            <a:endCxn id="7" idx="1"/>
+          </p:cNvCxnSpPr>
+          <p:nvPr/>
+        </p:nvCxnSpPr>
+        <p:spPr>
+          <a:xfrm>
+            <a:off x="2483768" y="1088740"/>
+            <a:ext cx="1152128" cy="0"/>
+          </a:xfrm>
+          <a:prstGeom prst="line">
+            <a:avLst/>
+          </a:prstGeom>
+          <a:ln>
+            <a:solidFill>
+              <a:schemeClr val="accent2">
+                <a:lumMod val="75000"/>
+              </a:schemeClr>
+            </a:solidFill>
+          </a:ln>
+        </p:spPr>
+        <p:style>
+          <a:lnRef idx="1">
+            <a:schemeClr val="accent1"/>
+          </a:lnRef>
+          <a:fillRef idx="0">
+            <a:schemeClr val="accent1"/>
+          </a:fillRef>
+          <a:effectRef idx="0">
+            <a:schemeClr val="accent1"/>
+          </a:effectRef>
+          <a:fontRef idx="minor">
+            <a:schemeClr val="tx1"/>
+          </a:fontRef>
+        </p:style>
+      </p:cxnSp>
+      <p:cxnSp>
+        <p:nvCxnSpPr>
+          <p:cNvPr id="12" name="Connecteur en angle 11"/>
+          <p:cNvCxnSpPr>
+            <a:stCxn id="16" idx="1"/>
+            <a:endCxn id="26" idx="1"/>
+          </p:cNvCxnSpPr>
+          <p:nvPr/>
+        </p:nvCxnSpPr>
+        <p:spPr>
+          <a:xfrm rot="10800000" flipH="1" flipV="1">
+            <a:off x="179512" y="1088740"/>
+            <a:ext cx="3456384" cy="4536504"/>
+          </a:xfrm>
+          <a:prstGeom prst="bentConnector3">
+            <a:avLst>
+              <a:gd name="adj1" fmla="val -3465"/>
+            </a:avLst>
+          </a:prstGeom>
+          <a:ln>
+            <a:solidFill>
+              <a:schemeClr val="accent2">
+                <a:lumMod val="75000"/>
+              </a:schemeClr>
+            </a:solidFill>
+          </a:ln>
+        </p:spPr>
+        <p:style>
+          <a:lnRef idx="1">
+            <a:schemeClr val="accent1"/>
+          </a:lnRef>
+          <a:fillRef idx="0">
+            <a:schemeClr val="accent1"/>
+          </a:fillRef>
+          <a:effectRef idx="0">
+            <a:schemeClr val="accent1"/>
+          </a:effectRef>
+          <a:fontRef idx="minor">
+            <a:schemeClr val="tx1"/>
+          </a:fontRef>
+        </p:style>
+      </p:cxnSp>
+      <p:cxnSp>
+        <p:nvCxnSpPr>
+          <p:cNvPr id="20" name="Connecteur en angle 19"/>
+          <p:cNvCxnSpPr>
+            <a:stCxn id="16" idx="2"/>
+            <a:endCxn id="2" idx="0"/>
+          </p:cNvCxnSpPr>
+          <p:nvPr/>
+        </p:nvCxnSpPr>
+        <p:spPr>
+          <a:xfrm rot="16200000" flipH="1">
+            <a:off x="2753798" y="278650"/>
+            <a:ext cx="288032" cy="3132348"/>
+          </a:xfrm>
+          <a:prstGeom prst="bentConnector3">
             <a:avLst/>
           </a:prstGeom>
           <a:ln>

</xml_diff>